<commit_message>
This commit is a huge rebase for many commits from the last 3 weeks i did cache - Enabling FM access for read miss. single cycle core - bare metal running sc_core app,hw,sim rename to the mafio project Update README.md
</commit_message>
<xml_diff>
--- a/doc/CPU_Arch/Desgining a Core.pptx
+++ b/doc/CPU_Arch/Desgining a Core.pptx
@@ -151,6 +151,14 @@
 </p:presentation>
 </file>
 
+<file path=ppt/revisionInfo.xml><?xml version="1.0" encoding="utf-8"?>
+<p1510:revInfo xmlns:a="http://schemas.openxmlformats.org/drawingml/2006/main" xmlns:r="http://schemas.openxmlformats.org/officeDocument/2006/relationships" xmlns:p1510="http://schemas.microsoft.com/office/powerpoint/2015/10/main">
+  <p1510:revLst>
+    <p1510:client id="{F51641B2-A2F8-4217-B7C7-7D8849F20AE9}" v="9" dt="2023-02-05T20:38:22.868"/>
+  </p1510:revLst>
+</p1510:revInfo>
+</file>
+
 <file path=ppt/changesInfos/changesInfo1.xml><?xml version="1.0" encoding="utf-8"?>
 <pc:chgInfo xmlns:a="http://schemas.openxmlformats.org/drawingml/2006/main" xmlns:r="http://schemas.openxmlformats.org/officeDocument/2006/relationships" xmlns:ac="http://schemas.microsoft.com/office/drawing/2013/main/command" xmlns:pc="http://schemas.microsoft.com/office/powerpoint/2013/main/command">
   <pc:docChgLst>
@@ -2619,6 +2627,202 @@
             <pc:docMk/>
             <pc:sldMk cId="1294981329" sldId="269"/>
             <ac:picMk id="4" creationId="{B61E3BD1-D13F-47C6-BABB-A17F2F96FA08}"/>
+          </ac:picMkLst>
+        </pc:picChg>
+      </pc:sldChg>
+    </pc:docChg>
+  </pc:docChgLst>
+  <pc:docChgLst>
+    <pc:chgData name="Amichai Ben David" userId="effe4c4b-4611-44ab-9d6b-f44045953326" providerId="ADAL" clId="{F51641B2-A2F8-4217-B7C7-7D8849F20AE9}"/>
+    <pc:docChg chg="undo custSel addSld delSld modSld">
+      <pc:chgData name="Amichai Ben David" userId="effe4c4b-4611-44ab-9d6b-f44045953326" providerId="ADAL" clId="{F51641B2-A2F8-4217-B7C7-7D8849F20AE9}" dt="2023-02-05T20:38:22.868" v="30"/>
+      <pc:docMkLst>
+        <pc:docMk/>
+      </pc:docMkLst>
+      <pc:sldChg chg="modSp mod">
+        <pc:chgData name="Amichai Ben David" userId="effe4c4b-4611-44ab-9d6b-f44045953326" providerId="ADAL" clId="{F51641B2-A2F8-4217-B7C7-7D8849F20AE9}" dt="2023-02-05T20:36:03.792" v="14" actId="20577"/>
+        <pc:sldMkLst>
+          <pc:docMk/>
+          <pc:sldMk cId="2903180755" sldId="283"/>
+        </pc:sldMkLst>
+        <pc:spChg chg="mod">
+          <ac:chgData name="Amichai Ben David" userId="effe4c4b-4611-44ab-9d6b-f44045953326" providerId="ADAL" clId="{F51641B2-A2F8-4217-B7C7-7D8849F20AE9}" dt="2023-02-05T20:36:03.792" v="14" actId="20577"/>
+          <ac:spMkLst>
+            <pc:docMk/>
+            <pc:sldMk cId="2903180755" sldId="283"/>
+            <ac:spMk id="4" creationId="{20933F70-49CE-4115-999F-9DBD567B3C41}"/>
+          </ac:spMkLst>
+        </pc:spChg>
+      </pc:sldChg>
+      <pc:sldChg chg="addSp delSp modSp mod">
+        <pc:chgData name="Amichai Ben David" userId="effe4c4b-4611-44ab-9d6b-f44045953326" providerId="ADAL" clId="{F51641B2-A2F8-4217-B7C7-7D8849F20AE9}" dt="2023-02-05T20:38:22.868" v="30"/>
+        <pc:sldMkLst>
+          <pc:docMk/>
+          <pc:sldMk cId="3184610834" sldId="284"/>
+        </pc:sldMkLst>
+        <pc:spChg chg="add del mod">
+          <ac:chgData name="Amichai Ben David" userId="effe4c4b-4611-44ab-9d6b-f44045953326" providerId="ADAL" clId="{F51641B2-A2F8-4217-B7C7-7D8849F20AE9}" dt="2023-02-05T20:38:22.620" v="29" actId="478"/>
+          <ac:spMkLst>
+            <pc:docMk/>
+            <pc:sldMk cId="3184610834" sldId="284"/>
+            <ac:spMk id="4" creationId="{31D8D132-9725-95B8-3AF0-1F6A349D1AB0}"/>
+          </ac:spMkLst>
+        </pc:spChg>
+        <pc:spChg chg="add mod">
+          <ac:chgData name="Amichai Ben David" userId="effe4c4b-4611-44ab-9d6b-f44045953326" providerId="ADAL" clId="{F51641B2-A2F8-4217-B7C7-7D8849F20AE9}" dt="2023-02-05T20:38:22.868" v="30"/>
+          <ac:spMkLst>
+            <pc:docMk/>
+            <pc:sldMk cId="3184610834" sldId="284"/>
+            <ac:spMk id="5" creationId="{81C9B97E-2F64-5B19-8F14-79220476BE66}"/>
+          </ac:spMkLst>
+        </pc:spChg>
+        <pc:spChg chg="del">
+          <ac:chgData name="Amichai Ben David" userId="effe4c4b-4611-44ab-9d6b-f44045953326" providerId="ADAL" clId="{F51641B2-A2F8-4217-B7C7-7D8849F20AE9}" dt="2023-02-05T20:38:15.275" v="27" actId="478"/>
+          <ac:spMkLst>
+            <pc:docMk/>
+            <pc:sldMk cId="3184610834" sldId="284"/>
+            <ac:spMk id="10" creationId="{D97868E5-937F-4537-9C69-74C505250ACD}"/>
+          </ac:spMkLst>
+        </pc:spChg>
+        <pc:picChg chg="add mod">
+          <ac:chgData name="Amichai Ben David" userId="effe4c4b-4611-44ab-9d6b-f44045953326" providerId="ADAL" clId="{F51641B2-A2F8-4217-B7C7-7D8849F20AE9}" dt="2023-02-05T20:37:11.394" v="23"/>
+          <ac:picMkLst>
+            <pc:docMk/>
+            <pc:sldMk cId="3184610834" sldId="284"/>
+            <ac:picMk id="3" creationId="{3145687D-89AA-F223-7237-4FC27CC947F1}"/>
+          </ac:picMkLst>
+        </pc:picChg>
+        <pc:picChg chg="del">
+          <ac:chgData name="Amichai Ben David" userId="effe4c4b-4611-44ab-9d6b-f44045953326" providerId="ADAL" clId="{F51641B2-A2F8-4217-B7C7-7D8849F20AE9}" dt="2023-02-05T20:37:08.459" v="22" actId="478"/>
+          <ac:picMkLst>
+            <pc:docMk/>
+            <pc:sldMk cId="3184610834" sldId="284"/>
+            <ac:picMk id="8" creationId="{FEA7B9ED-577F-487F-8404-0BA081C41341}"/>
+          </ac:picMkLst>
+        </pc:picChg>
+      </pc:sldChg>
+      <pc:sldChg chg="addSp delSp modSp mod">
+        <pc:chgData name="Amichai Ben David" userId="effe4c4b-4611-44ab-9d6b-f44045953326" providerId="ADAL" clId="{F51641B2-A2F8-4217-B7C7-7D8849F20AE9}" dt="2023-02-05T20:37:05.207" v="21" actId="1076"/>
+        <pc:sldMkLst>
+          <pc:docMk/>
+          <pc:sldMk cId="3093162052" sldId="285"/>
+        </pc:sldMkLst>
+        <pc:spChg chg="add del mod">
+          <ac:chgData name="Amichai Ben David" userId="effe4c4b-4611-44ab-9d6b-f44045953326" providerId="ADAL" clId="{F51641B2-A2F8-4217-B7C7-7D8849F20AE9}" dt="2023-02-05T20:36:57.085" v="18"/>
+          <ac:spMkLst>
+            <pc:docMk/>
+            <pc:sldMk cId="3093162052" sldId="285"/>
+            <ac:spMk id="4" creationId="{22F00B87-E70D-5F3E-5E7D-FC9E64169353}"/>
+          </ac:spMkLst>
+        </pc:spChg>
+        <pc:picChg chg="add del mod">
+          <ac:chgData name="Amichai Ben David" userId="effe4c4b-4611-44ab-9d6b-f44045953326" providerId="ADAL" clId="{F51641B2-A2F8-4217-B7C7-7D8849F20AE9}" dt="2023-02-05T20:36:56.380" v="17"/>
+          <ac:picMkLst>
+            <pc:docMk/>
+            <pc:sldMk cId="3093162052" sldId="285"/>
+            <ac:picMk id="5" creationId="{51F09EC6-F469-58FF-15D3-BA792F31454A}"/>
+          </ac:picMkLst>
+        </pc:picChg>
+        <pc:picChg chg="add mod">
+          <ac:chgData name="Amichai Ben David" userId="effe4c4b-4611-44ab-9d6b-f44045953326" providerId="ADAL" clId="{F51641B2-A2F8-4217-B7C7-7D8849F20AE9}" dt="2023-02-05T20:37:05.207" v="21" actId="1076"/>
+          <ac:picMkLst>
+            <pc:docMk/>
+            <pc:sldMk cId="3093162052" sldId="285"/>
+            <ac:picMk id="6" creationId="{EE35BE7C-3406-12BB-C34B-FDA85199F6BD}"/>
+          </ac:picMkLst>
+        </pc:picChg>
+        <pc:picChg chg="del">
+          <ac:chgData name="Amichai Ben David" userId="effe4c4b-4611-44ab-9d6b-f44045953326" providerId="ADAL" clId="{F51641B2-A2F8-4217-B7C7-7D8849F20AE9}" dt="2023-02-05T20:36:54.115" v="15" actId="478"/>
+          <ac:picMkLst>
+            <pc:docMk/>
+            <pc:sldMk cId="3093162052" sldId="285"/>
+            <ac:picMk id="7" creationId="{D34C99EF-C428-4D79-ADA5-7D4A3EBF710D}"/>
+          </ac:picMkLst>
+        </pc:picChg>
+      </pc:sldChg>
+      <pc:sldChg chg="addSp delSp modSp mod">
+        <pc:chgData name="Amichai Ben David" userId="effe4c4b-4611-44ab-9d6b-f44045953326" providerId="ADAL" clId="{F51641B2-A2F8-4217-B7C7-7D8849F20AE9}" dt="2023-02-05T20:37:59.817" v="26" actId="478"/>
+        <pc:sldMkLst>
+          <pc:docMk/>
+          <pc:sldMk cId="4255119356" sldId="287"/>
+        </pc:sldMkLst>
+        <pc:spChg chg="add mod">
+          <ac:chgData name="Amichai Ben David" userId="effe4c4b-4611-44ab-9d6b-f44045953326" providerId="ADAL" clId="{F51641B2-A2F8-4217-B7C7-7D8849F20AE9}" dt="2023-02-05T20:37:55.667" v="25"/>
+          <ac:spMkLst>
+            <pc:docMk/>
+            <pc:sldMk cId="4255119356" sldId="287"/>
+            <ac:spMk id="3" creationId="{6429B7FB-8CA7-0F15-C50E-A03742A2C062}"/>
+          </ac:spMkLst>
+        </pc:spChg>
+        <pc:spChg chg="add del mod">
+          <ac:chgData name="Amichai Ben David" userId="effe4c4b-4611-44ab-9d6b-f44045953326" providerId="ADAL" clId="{F51641B2-A2F8-4217-B7C7-7D8849F20AE9}" dt="2023-02-05T20:37:59.817" v="26" actId="478"/>
+          <ac:spMkLst>
+            <pc:docMk/>
+            <pc:sldMk cId="4255119356" sldId="287"/>
+            <ac:spMk id="6" creationId="{100481DE-1692-1543-9278-B6BF1B9D1E24}"/>
+          </ac:spMkLst>
+        </pc:spChg>
+        <pc:spChg chg="del">
+          <ac:chgData name="Amichai Ben David" userId="effe4c4b-4611-44ab-9d6b-f44045953326" providerId="ADAL" clId="{F51641B2-A2F8-4217-B7C7-7D8849F20AE9}" dt="2023-02-05T20:37:55.476" v="24" actId="478"/>
+          <ac:spMkLst>
+            <pc:docMk/>
+            <pc:sldMk cId="4255119356" sldId="287"/>
+            <ac:spMk id="7" creationId="{15E8E142-BB57-4677-A5AF-DC8DE9430F7F}"/>
+          </ac:spMkLst>
+        </pc:spChg>
+        <pc:spChg chg="add del mod">
+          <ac:chgData name="Amichai Ben David" userId="effe4c4b-4611-44ab-9d6b-f44045953326" providerId="ADAL" clId="{F51641B2-A2F8-4217-B7C7-7D8849F20AE9}" dt="2023-02-05T20:37:59.817" v="26" actId="478"/>
+          <ac:spMkLst>
+            <pc:docMk/>
+            <pc:sldMk cId="4255119356" sldId="287"/>
+            <ac:spMk id="8" creationId="{3E8408B6-1251-1ED6-1820-3697D78056F9}"/>
+          </ac:spMkLst>
+        </pc:spChg>
+        <pc:spChg chg="add del mod">
+          <ac:chgData name="Amichai Ben David" userId="effe4c4b-4611-44ab-9d6b-f44045953326" providerId="ADAL" clId="{F51641B2-A2F8-4217-B7C7-7D8849F20AE9}" dt="2023-02-05T20:37:59.817" v="26" actId="478"/>
+          <ac:spMkLst>
+            <pc:docMk/>
+            <pc:sldMk cId="4255119356" sldId="287"/>
+            <ac:spMk id="9" creationId="{D3801677-82F4-35CE-261B-62287012FC83}"/>
+          </ac:spMkLst>
+        </pc:spChg>
+        <pc:spChg chg="add del mod">
+          <ac:chgData name="Amichai Ben David" userId="effe4c4b-4611-44ab-9d6b-f44045953326" providerId="ADAL" clId="{F51641B2-A2F8-4217-B7C7-7D8849F20AE9}" dt="2023-02-05T20:37:59.817" v="26" actId="478"/>
+          <ac:spMkLst>
+            <pc:docMk/>
+            <pc:sldMk cId="4255119356" sldId="287"/>
+            <ac:spMk id="10" creationId="{15678622-95F0-DA40-88E3-FCD5A3ECD75D}"/>
+          </ac:spMkLst>
+        </pc:spChg>
+      </pc:sldChg>
+      <pc:sldChg chg="addSp delSp modSp new del mod">
+        <pc:chgData name="Amichai Ben David" userId="effe4c4b-4611-44ab-9d6b-f44045953326" providerId="ADAL" clId="{F51641B2-A2F8-4217-B7C7-7D8849F20AE9}" dt="2023-02-05T20:35:16.237" v="13" actId="680"/>
+        <pc:sldMkLst>
+          <pc:docMk/>
+          <pc:sldMk cId="1623056625" sldId="297"/>
+        </pc:sldMkLst>
+        <pc:spChg chg="add del">
+          <ac:chgData name="Amichai Ben David" userId="effe4c4b-4611-44ab-9d6b-f44045953326" providerId="ADAL" clId="{F51641B2-A2F8-4217-B7C7-7D8849F20AE9}" dt="2023-02-05T20:35:16.173" v="12" actId="478"/>
+          <ac:spMkLst>
+            <pc:docMk/>
+            <pc:sldMk cId="1623056625" sldId="297"/>
+            <ac:spMk id="2" creationId="{C7EF3C4F-367B-F735-026A-ED90D5E55C63}"/>
+          </ac:spMkLst>
+        </pc:spChg>
+        <pc:spChg chg="add del">
+          <ac:chgData name="Amichai Ben David" userId="effe4c4b-4611-44ab-9d6b-f44045953326" providerId="ADAL" clId="{F51641B2-A2F8-4217-B7C7-7D8849F20AE9}" dt="2023-02-05T20:35:16.173" v="12" actId="478"/>
+          <ac:spMkLst>
+            <pc:docMk/>
+            <pc:sldMk cId="1623056625" sldId="297"/>
+            <ac:spMk id="3" creationId="{73AFAA37-1847-C14D-5A2D-73233E6D7018}"/>
+          </ac:spMkLst>
+        </pc:spChg>
+        <pc:picChg chg="add del mod">
+          <ac:chgData name="Amichai Ben David" userId="effe4c4b-4611-44ab-9d6b-f44045953326" providerId="ADAL" clId="{F51641B2-A2F8-4217-B7C7-7D8849F20AE9}" dt="2023-02-05T20:35:16.167" v="11"/>
+          <ac:picMkLst>
+            <pc:docMk/>
+            <pc:sldMk cId="1623056625" sldId="297"/>
+            <ac:picMk id="4" creationId="{A692AACE-AFBD-CC66-27C9-7549EF29B88C}"/>
           </ac:picMkLst>
         </pc:picChg>
       </pc:sldChg>
@@ -2709,7 +2913,7 @@
           <a:p>
             <a:fld id="{A8DE4784-5831-4D77-94A6-F282EA075FE8}" type="datetimeFigureOut">
               <a:rPr lang="en-IL" smtClean="0"/>
-              <a:t>04/07/2022</a:t>
+              <a:t>05/02/2023</a:t>
             </a:fld>
             <a:endParaRPr lang="en-IL"/>
           </a:p>
@@ -3331,7 +3535,7 @@
           <a:p>
             <a:fld id="{5AF13520-DA24-4CFD-B384-0F3A9F34B494}" type="datetimeFigureOut">
               <a:rPr lang="en-IL" smtClean="0"/>
-              <a:t>04/07/2022</a:t>
+              <a:t>05/02/2023</a:t>
             </a:fld>
             <a:endParaRPr lang="en-IL"/>
           </a:p>
@@ -3606,7 +3810,7 @@
           <a:p>
             <a:fld id="{5AF13520-DA24-4CFD-B384-0F3A9F34B494}" type="datetimeFigureOut">
               <a:rPr lang="en-IL" smtClean="0"/>
-              <a:t>04/07/2022</a:t>
+              <a:t>05/02/2023</a:t>
             </a:fld>
             <a:endParaRPr lang="en-IL"/>
           </a:p>
@@ -3800,7 +4004,7 @@
           <a:p>
             <a:fld id="{5AF13520-DA24-4CFD-B384-0F3A9F34B494}" type="datetimeFigureOut">
               <a:rPr lang="en-IL" smtClean="0"/>
-              <a:t>04/07/2022</a:t>
+              <a:t>05/02/2023</a:t>
             </a:fld>
             <a:endParaRPr lang="en-IL"/>
           </a:p>
@@ -4073,7 +4277,7 @@
           <a:p>
             <a:fld id="{5AF13520-DA24-4CFD-B384-0F3A9F34B494}" type="datetimeFigureOut">
               <a:rPr lang="en-IL" smtClean="0"/>
-              <a:t>04/07/2022</a:t>
+              <a:t>05/02/2023</a:t>
             </a:fld>
             <a:endParaRPr lang="en-IL"/>
           </a:p>
@@ -4414,7 +4618,7 @@
           <a:p>
             <a:fld id="{5AF13520-DA24-4CFD-B384-0F3A9F34B494}" type="datetimeFigureOut">
               <a:rPr lang="en-IL" smtClean="0"/>
-              <a:t>04/07/2022</a:t>
+              <a:t>05/02/2023</a:t>
             </a:fld>
             <a:endParaRPr lang="en-IL"/>
           </a:p>
@@ -5037,7 +5241,7 @@
           <a:p>
             <a:fld id="{5AF13520-DA24-4CFD-B384-0F3A9F34B494}" type="datetimeFigureOut">
               <a:rPr lang="en-IL" smtClean="0"/>
-              <a:t>04/07/2022</a:t>
+              <a:t>05/02/2023</a:t>
             </a:fld>
             <a:endParaRPr lang="en-IL"/>
           </a:p>
@@ -5897,7 +6101,7 @@
           <a:p>
             <a:fld id="{5AF13520-DA24-4CFD-B384-0F3A9F34B494}" type="datetimeFigureOut">
               <a:rPr lang="en-IL" smtClean="0"/>
-              <a:t>04/07/2022</a:t>
+              <a:t>05/02/2023</a:t>
             </a:fld>
             <a:endParaRPr lang="en-IL"/>
           </a:p>
@@ -6067,7 +6271,7 @@
           <a:p>
             <a:fld id="{5AF13520-DA24-4CFD-B384-0F3A9F34B494}" type="datetimeFigureOut">
               <a:rPr lang="en-IL" smtClean="0"/>
-              <a:t>04/07/2022</a:t>
+              <a:t>05/02/2023</a:t>
             </a:fld>
             <a:endParaRPr lang="en-IL"/>
           </a:p>
@@ -6247,7 +6451,7 @@
           <a:p>
             <a:fld id="{5AF13520-DA24-4CFD-B384-0F3A9F34B494}" type="datetimeFigureOut">
               <a:rPr lang="en-IL" smtClean="0"/>
-              <a:t>04/07/2022</a:t>
+              <a:t>05/02/2023</a:t>
             </a:fld>
             <a:endParaRPr lang="en-IL"/>
           </a:p>
@@ -6417,7 +6621,7 @@
           <a:p>
             <a:fld id="{5AF13520-DA24-4CFD-B384-0F3A9F34B494}" type="datetimeFigureOut">
               <a:rPr lang="en-IL" smtClean="0"/>
-              <a:t>04/07/2022</a:t>
+              <a:t>05/02/2023</a:t>
             </a:fld>
             <a:endParaRPr lang="en-IL"/>
           </a:p>
@@ -6664,7 +6868,7 @@
           <a:p>
             <a:fld id="{5AF13520-DA24-4CFD-B384-0F3A9F34B494}" type="datetimeFigureOut">
               <a:rPr lang="en-IL" smtClean="0"/>
-              <a:t>04/07/2022</a:t>
+              <a:t>05/02/2023</a:t>
             </a:fld>
             <a:endParaRPr lang="en-IL"/>
           </a:p>
@@ -6956,7 +7160,7 @@
           <a:p>
             <a:fld id="{5AF13520-DA24-4CFD-B384-0F3A9F34B494}" type="datetimeFigureOut">
               <a:rPr lang="en-IL" smtClean="0"/>
-              <a:t>04/07/2022</a:t>
+              <a:t>05/02/2023</a:t>
             </a:fld>
             <a:endParaRPr lang="en-IL"/>
           </a:p>
@@ -7400,7 +7604,7 @@
           <a:p>
             <a:fld id="{5AF13520-DA24-4CFD-B384-0F3A9F34B494}" type="datetimeFigureOut">
               <a:rPr lang="en-IL" smtClean="0"/>
-              <a:t>04/07/2022</a:t>
+              <a:t>05/02/2023</a:t>
             </a:fld>
             <a:endParaRPr lang="en-IL"/>
           </a:p>
@@ -7518,7 +7722,7 @@
           <a:p>
             <a:fld id="{5AF13520-DA24-4CFD-B384-0F3A9F34B494}" type="datetimeFigureOut">
               <a:rPr lang="en-IL" smtClean="0"/>
-              <a:t>04/07/2022</a:t>
+              <a:t>05/02/2023</a:t>
             </a:fld>
             <a:endParaRPr lang="en-IL"/>
           </a:p>
@@ -7613,7 +7817,7 @@
           <a:p>
             <a:fld id="{5AF13520-DA24-4CFD-B384-0F3A9F34B494}" type="datetimeFigureOut">
               <a:rPr lang="en-IL" smtClean="0"/>
-              <a:t>04/07/2022</a:t>
+              <a:t>05/02/2023</a:t>
             </a:fld>
             <a:endParaRPr lang="en-IL"/>
           </a:p>
@@ -7892,7 +8096,7 @@
           <a:p>
             <a:fld id="{5AF13520-DA24-4CFD-B384-0F3A9F34B494}" type="datetimeFigureOut">
               <a:rPr lang="en-IL" smtClean="0"/>
-              <a:t>04/07/2022</a:t>
+              <a:t>05/02/2023</a:t>
             </a:fld>
             <a:endParaRPr lang="en-IL"/>
           </a:p>
@@ -8167,7 +8371,7 @@
           <a:p>
             <a:fld id="{5AF13520-DA24-4CFD-B384-0F3A9F34B494}" type="datetimeFigureOut">
               <a:rPr lang="en-IL" smtClean="0"/>
-              <a:t>04/07/2022</a:t>
+              <a:t>05/02/2023</a:t>
             </a:fld>
             <a:endParaRPr lang="en-IL"/>
           </a:p>
@@ -8596,7 +8800,7 @@
           <a:p>
             <a:fld id="{5AF13520-DA24-4CFD-B384-0F3A9F34B494}" type="datetimeFigureOut">
               <a:rPr lang="en-IL" smtClean="0"/>
-              <a:t>04/07/2022</a:t>
+              <a:t>05/02/2023</a:t>
             </a:fld>
             <a:endParaRPr lang="en-IL"/>
           </a:p>
@@ -11334,15 +11538,7 @@
           <a:p>
             <a:r>
               <a:rPr lang="en-US" sz="1100" dirty="0"/>
-              <a:t>// </a:t>
-            </a:r>
-            <a:r>
-              <a:rPr lang="en-US" sz="1100" dirty="0" err="1"/>
-              <a:t>Acceess</a:t>
-            </a:r>
-            <a:r>
-              <a:rPr lang="en-US" sz="1100" dirty="0"/>
-              <a:t> D_MEM for Write (STORE) and Reads (LOAD). – use Byte Enable and Sign-Extend indications.</a:t>
+              <a:t>// Access D_MEM for Write (STORE) and Reads (LOAD). – use Byte Enable and Sign-Extend indications.</a:t>
             </a:r>
           </a:p>
           <a:p>
@@ -15181,43 +15377,6 @@
           </a:p>
         </p:txBody>
       </p:sp>
-      <p:pic>
-        <p:nvPicPr>
-          <p:cNvPr id="7" name="Content Placeholder 3">
-            <a:extLst>
-              <a:ext uri="{FF2B5EF4-FFF2-40B4-BE49-F238E27FC236}">
-                <a16:creationId xmlns:a16="http://schemas.microsoft.com/office/drawing/2014/main" id="{D34C99EF-C428-4D79-ADA5-7D4A3EBF710D}"/>
-              </a:ext>
-            </a:extLst>
-          </p:cNvPr>
-          <p:cNvPicPr>
-            <a:picLocks noGrp="1" noChangeAspect="1"/>
-          </p:cNvPicPr>
-          <p:nvPr>
-            <p:ph idx="1"/>
-          </p:nvPr>
-        </p:nvPicPr>
-        <p:blipFill>
-          <a:blip r:embed="rId2">
-            <a:extLst>
-              <a:ext uri="{28A0092B-C50C-407E-A947-70E740481C1C}">
-                <a14:useLocalDpi xmlns:a14="http://schemas.microsoft.com/office/drawing/2010/main" val="0"/>
-              </a:ext>
-            </a:extLst>
-          </a:blip>
-          <a:srcRect/>
-          <a:stretch/>
-        </p:blipFill>
-        <p:spPr>
-          <a:xfrm>
-            <a:off x="4727149" y="1269955"/>
-            <a:ext cx="7373412" cy="5462315"/>
-          </a:xfrm>
-          <a:prstGeom prst="rect">
-            <a:avLst/>
-          </a:prstGeom>
-        </p:spPr>
-      </p:pic>
       <p:sp>
         <p:nvSpPr>
           <p:cNvPr id="8" name="Rectangle 7">
@@ -15863,6 +16022,38 @@
           </a:p>
         </p:txBody>
       </p:sp>
+      <p:pic>
+        <p:nvPicPr>
+          <p:cNvPr id="6" name="Content Placeholder 3">
+            <a:extLst>
+              <a:ext uri="{FF2B5EF4-FFF2-40B4-BE49-F238E27FC236}">
+                <a16:creationId xmlns:a16="http://schemas.microsoft.com/office/drawing/2014/main" id="{EE35BE7C-3406-12BB-C34B-FDA85199F6BD}"/>
+              </a:ext>
+            </a:extLst>
+          </p:cNvPr>
+          <p:cNvPicPr>
+            <a:picLocks noGrp="1" noChangeAspect="1"/>
+          </p:cNvPicPr>
+          <p:nvPr>
+            <p:ph idx="1"/>
+          </p:nvPr>
+        </p:nvPicPr>
+        <p:blipFill>
+          <a:blip r:embed="rId2"/>
+          <a:stretch>
+            <a:fillRect/>
+          </a:stretch>
+        </p:blipFill>
+        <p:spPr>
+          <a:xfrm>
+            <a:off x="4707326" y="1853248"/>
+            <a:ext cx="7289988" cy="4304619"/>
+          </a:xfrm>
+          <a:prstGeom prst="rect">
+            <a:avLst/>
+          </a:prstGeom>
+        </p:spPr>
+      </p:pic>
     </p:spTree>
     <p:extLst>
       <p:ext uri="{BB962C8B-B14F-4D97-AF65-F5344CB8AC3E}">
@@ -15922,12 +16113,44 @@
           </a:p>
         </p:txBody>
       </p:sp>
+      <p:pic>
+        <p:nvPicPr>
+          <p:cNvPr id="3" name="Content Placeholder 3">
+            <a:extLst>
+              <a:ext uri="{FF2B5EF4-FFF2-40B4-BE49-F238E27FC236}">
+                <a16:creationId xmlns:a16="http://schemas.microsoft.com/office/drawing/2014/main" id="{3145687D-89AA-F223-7237-4FC27CC947F1}"/>
+              </a:ext>
+            </a:extLst>
+          </p:cNvPr>
+          <p:cNvPicPr>
+            <a:picLocks noGrp="1" noChangeAspect="1"/>
+          </p:cNvPicPr>
+          <p:nvPr>
+            <p:ph idx="1"/>
+          </p:nvPr>
+        </p:nvPicPr>
+        <p:blipFill>
+          <a:blip r:embed="rId2"/>
+          <a:stretch>
+            <a:fillRect/>
+          </a:stretch>
+        </p:blipFill>
+        <p:spPr>
+          <a:xfrm>
+            <a:off x="4707326" y="1853248"/>
+            <a:ext cx="7289988" cy="4304619"/>
+          </a:xfrm>
+          <a:prstGeom prst="rect">
+            <a:avLst/>
+          </a:prstGeom>
+        </p:spPr>
+      </p:pic>
       <p:sp>
         <p:nvSpPr>
-          <p:cNvPr id="10" name="Rectangle 9">
+          <p:cNvPr id="5" name="Rectangle 4">
             <a:extLst>
               <a:ext uri="{FF2B5EF4-FFF2-40B4-BE49-F238E27FC236}">
-                <a16:creationId xmlns:a16="http://schemas.microsoft.com/office/drawing/2014/main" id="{D97868E5-937F-4537-9C69-74C505250ACD}"/>
+                <a16:creationId xmlns:a16="http://schemas.microsoft.com/office/drawing/2014/main" id="{81C9B97E-2F64-5B19-8F14-79220476BE66}"/>
               </a:ext>
             </a:extLst>
           </p:cNvPr>
@@ -15937,7 +16160,7 @@
         <p:spPr>
           <a:xfrm>
             <a:off x="206514" y="1913670"/>
-            <a:ext cx="4447298" cy="4308872"/>
+            <a:ext cx="4447298" cy="4739759"/>
           </a:xfrm>
           <a:prstGeom prst="rect">
             <a:avLst/>
@@ -15995,21 +16218,7 @@
                 <a:latin typeface="Courier New" panose="02070309020205020404" pitchFamily="49" charset="0"/>
                 <a:cs typeface="Courier New" panose="02070309020205020404" pitchFamily="49" charset="0"/>
               </a:rPr>
-              <a:t>         </a:t>
-            </a:r>
-            <a:r>
-              <a:rPr lang="en-US" sz="1400" dirty="0" err="1">
-                <a:latin typeface="Courier New" panose="02070309020205020404" pitchFamily="49" charset="0"/>
-                <a:cs typeface="Courier New" panose="02070309020205020404" pitchFamily="49" charset="0"/>
-              </a:rPr>
-              <a:t>SelNextPcAluOut</a:t>
-            </a:r>
-            <a:r>
-              <a:rPr lang="en-US" sz="1400" dirty="0">
-                <a:latin typeface="Courier New" panose="02070309020205020404" pitchFamily="49" charset="0"/>
-                <a:cs typeface="Courier New" panose="02070309020205020404" pitchFamily="49" charset="0"/>
-              </a:rPr>
-              <a:t>;</a:t>
+              <a:t>         SelNextPcAluOut;</a:t>
             </a:r>
           </a:p>
           <a:p>
@@ -16031,21 +16240,7 @@
                 <a:latin typeface="Courier New" panose="02070309020205020404" pitchFamily="49" charset="0"/>
                 <a:cs typeface="Courier New" panose="02070309020205020404" pitchFamily="49" charset="0"/>
               </a:rPr>
-              <a:t>         </a:t>
-            </a:r>
-            <a:r>
-              <a:rPr lang="en-US" sz="1400" dirty="0" err="1">
-                <a:latin typeface="Courier New" panose="02070309020205020404" pitchFamily="49" charset="0"/>
-                <a:cs typeface="Courier New" panose="02070309020205020404" pitchFamily="49" charset="0"/>
-              </a:rPr>
-              <a:t>SelRegWrPc</a:t>
-            </a:r>
-            <a:r>
-              <a:rPr lang="en-US" sz="1400" dirty="0">
-                <a:latin typeface="Courier New" panose="02070309020205020404" pitchFamily="49" charset="0"/>
-                <a:cs typeface="Courier New" panose="02070309020205020404" pitchFamily="49" charset="0"/>
-              </a:rPr>
-              <a:t>;</a:t>
+              <a:t>         SelRegWrPc; </a:t>
             </a:r>
           </a:p>
           <a:p>
@@ -16067,21 +16262,7 @@
                 <a:latin typeface="Courier New" panose="02070309020205020404" pitchFamily="49" charset="0"/>
                 <a:cs typeface="Courier New" panose="02070309020205020404" pitchFamily="49" charset="0"/>
               </a:rPr>
-              <a:t>         </a:t>
-            </a:r>
-            <a:r>
-              <a:rPr lang="en-US" sz="1400" dirty="0" err="1">
-                <a:latin typeface="Courier New" panose="02070309020205020404" pitchFamily="49" charset="0"/>
-                <a:cs typeface="Courier New" panose="02070309020205020404" pitchFamily="49" charset="0"/>
-              </a:rPr>
-              <a:t>BranchCondMet</a:t>
-            </a:r>
-            <a:r>
-              <a:rPr lang="en-US" sz="1400" dirty="0">
-                <a:latin typeface="Courier New" panose="02070309020205020404" pitchFamily="49" charset="0"/>
-                <a:cs typeface="Courier New" panose="02070309020205020404" pitchFamily="49" charset="0"/>
-              </a:rPr>
-              <a:t>; </a:t>
+              <a:t>         SelDMemWb;</a:t>
             </a:r>
           </a:p>
           <a:p>
@@ -16103,21 +16284,7 @@
                 <a:latin typeface="Courier New" panose="02070309020205020404" pitchFamily="49" charset="0"/>
                 <a:cs typeface="Courier New" panose="02070309020205020404" pitchFamily="49" charset="0"/>
               </a:rPr>
-              <a:t>         </a:t>
-            </a:r>
-            <a:r>
-              <a:rPr lang="en-US" sz="1400" dirty="0" err="1">
-                <a:latin typeface="Courier New" panose="02070309020205020404" pitchFamily="49" charset="0"/>
-                <a:cs typeface="Courier New" panose="02070309020205020404" pitchFamily="49" charset="0"/>
-              </a:rPr>
-              <a:t>SelDMemWb</a:t>
-            </a:r>
-            <a:r>
-              <a:rPr lang="en-US" sz="1400" dirty="0">
-                <a:latin typeface="Courier New" panose="02070309020205020404" pitchFamily="49" charset="0"/>
-                <a:cs typeface="Courier New" panose="02070309020205020404" pitchFamily="49" charset="0"/>
-              </a:rPr>
-              <a:t>;</a:t>
+              <a:t>         SelAluPc ;</a:t>
             </a:r>
           </a:p>
           <a:p>
@@ -16139,21 +16306,36 @@
                 <a:latin typeface="Courier New" panose="02070309020205020404" pitchFamily="49" charset="0"/>
                 <a:cs typeface="Courier New" panose="02070309020205020404" pitchFamily="49" charset="0"/>
               </a:rPr>
-              <a:t>         </a:t>
-            </a:r>
+              <a:t>         SelAluImm;</a:t>
+            </a:r>
+          </a:p>
+          <a:p>
             <a:r>
               <a:rPr lang="en-US" sz="1400" dirty="0" err="1">
-                <a:latin typeface="Courier New" panose="02070309020205020404" pitchFamily="49" charset="0"/>
-                <a:cs typeface="Courier New" panose="02070309020205020404" pitchFamily="49" charset="0"/>
-              </a:rPr>
-              <a:t>SelAluPc</a:t>
-            </a:r>
-            <a:r>
-              <a:rPr lang="en-US" sz="1400" dirty="0">
-                <a:latin typeface="Courier New" panose="02070309020205020404" pitchFamily="49" charset="0"/>
-                <a:cs typeface="Courier New" panose="02070309020205020404" pitchFamily="49" charset="0"/>
-              </a:rPr>
-              <a:t> ;</a:t>
+                <a:solidFill>
+                  <a:srgbClr val="E6F8A6"/>
+                </a:solidFill>
+                <a:latin typeface="Courier New" panose="02070309020205020404" pitchFamily="49" charset="0"/>
+                <a:cs typeface="Courier New" panose="02070309020205020404" pitchFamily="49" charset="0"/>
+              </a:rPr>
+              <a:t>t_immediate</a:t>
+            </a:r>
+            <a:r>
+              <a:rPr lang="en-US" sz="1400" dirty="0">
+                <a:solidFill>
+                  <a:srgbClr val="E6F8A6"/>
+                </a:solidFill>
+                <a:latin typeface="Courier New" panose="02070309020205020404" pitchFamily="49" charset="0"/>
+                <a:cs typeface="Courier New" panose="02070309020205020404" pitchFamily="49" charset="0"/>
+              </a:rPr>
+              <a:t>   </a:t>
+            </a:r>
+            <a:r>
+              <a:rPr lang="en-US" sz="1400" dirty="0">
+                <a:latin typeface="Courier New" panose="02070309020205020404" pitchFamily="49" charset="0"/>
+                <a:cs typeface="Courier New" panose="02070309020205020404" pitchFamily="49" charset="0"/>
+              </a:rPr>
+              <a:t>SelImmType;</a:t>
             </a:r>
           </a:p>
           <a:p>
@@ -16175,33 +16357,19 @@
                 <a:latin typeface="Courier New" panose="02070309020205020404" pitchFamily="49" charset="0"/>
                 <a:cs typeface="Courier New" panose="02070309020205020404" pitchFamily="49" charset="0"/>
               </a:rPr>
-              <a:t>         </a:t>
-            </a:r>
+              <a:t>         BranchCondMet;</a:t>
+            </a:r>
+          </a:p>
+          <a:p>
             <a:r>
               <a:rPr lang="en-US" sz="1400" dirty="0" err="1">
-                <a:latin typeface="Courier New" panose="02070309020205020404" pitchFamily="49" charset="0"/>
-                <a:cs typeface="Courier New" panose="02070309020205020404" pitchFamily="49" charset="0"/>
-              </a:rPr>
-              <a:t>SelAluImm</a:t>
-            </a:r>
-            <a:r>
-              <a:rPr lang="en-US" sz="1400" dirty="0">
-                <a:latin typeface="Courier New" panose="02070309020205020404" pitchFamily="49" charset="0"/>
-                <a:cs typeface="Courier New" panose="02070309020205020404" pitchFamily="49" charset="0"/>
-              </a:rPr>
-              <a:t>;</a:t>
-            </a:r>
-          </a:p>
-          <a:p>
-            <a:r>
-              <a:rPr lang="en-US" sz="1400" dirty="0" err="1">
                 <a:solidFill>
                   <a:srgbClr val="E6F8A6"/>
                 </a:solidFill>
                 <a:latin typeface="Courier New" panose="02070309020205020404" pitchFamily="49" charset="0"/>
                 <a:cs typeface="Courier New" panose="02070309020205020404" pitchFamily="49" charset="0"/>
               </a:rPr>
-              <a:t>t_immediate</a:t>
+              <a:t>t_branch_type</a:t>
             </a:r>
             <a:r>
               <a:rPr lang="en-US" sz="1400" dirty="0">
@@ -16211,57 +16379,14 @@
                 <a:latin typeface="Courier New" panose="02070309020205020404" pitchFamily="49" charset="0"/>
                 <a:cs typeface="Courier New" panose="02070309020205020404" pitchFamily="49" charset="0"/>
               </a:rPr>
-              <a:t>   </a:t>
-            </a:r>
-            <a:r>
-              <a:rPr lang="en-US" sz="1400" dirty="0" err="1">
-                <a:latin typeface="Courier New" panose="02070309020205020404" pitchFamily="49" charset="0"/>
-                <a:cs typeface="Courier New" panose="02070309020205020404" pitchFamily="49" charset="0"/>
-              </a:rPr>
-              <a:t>SelImmType</a:t>
-            </a:r>
-            <a:r>
-              <a:rPr lang="en-US" sz="1400" dirty="0">
-                <a:latin typeface="Courier New" panose="02070309020205020404" pitchFamily="49" charset="0"/>
-                <a:cs typeface="Courier New" panose="02070309020205020404" pitchFamily="49" charset="0"/>
-              </a:rPr>
-              <a:t>;</a:t>
-            </a:r>
-          </a:p>
-          <a:p>
-            <a:r>
-              <a:rPr lang="en-US" sz="1400" dirty="0" err="1">
-                <a:solidFill>
-                  <a:srgbClr val="E6F8A6"/>
-                </a:solidFill>
-                <a:latin typeface="Courier New" panose="02070309020205020404" pitchFamily="49" charset="0"/>
-                <a:cs typeface="Courier New" panose="02070309020205020404" pitchFamily="49" charset="0"/>
-              </a:rPr>
-              <a:t>t_branch_type</a:t>
-            </a:r>
-            <a:r>
-              <a:rPr lang="en-US" sz="1400" dirty="0">
-                <a:solidFill>
-                  <a:srgbClr val="E6F8A6"/>
-                </a:solidFill>
-                <a:latin typeface="Courier New" panose="02070309020205020404" pitchFamily="49" charset="0"/>
-                <a:cs typeface="Courier New" panose="02070309020205020404" pitchFamily="49" charset="0"/>
-              </a:rPr>
               <a:t> </a:t>
             </a:r>
             <a:r>
-              <a:rPr lang="en-US" sz="1400" dirty="0" err="1">
-                <a:latin typeface="Courier New" panose="02070309020205020404" pitchFamily="49" charset="0"/>
-                <a:cs typeface="Courier New" panose="02070309020205020404" pitchFamily="49" charset="0"/>
-              </a:rPr>
-              <a:t>CtrlBranchOp</a:t>
-            </a:r>
-            <a:r>
-              <a:rPr lang="en-US" sz="1400" dirty="0">
-                <a:latin typeface="Courier New" panose="02070309020205020404" pitchFamily="49" charset="0"/>
-                <a:cs typeface="Courier New" panose="02070309020205020404" pitchFamily="49" charset="0"/>
-              </a:rPr>
-              <a:t>;</a:t>
+              <a:rPr lang="en-US" sz="1400" dirty="0">
+                <a:latin typeface="Courier New" panose="02070309020205020404" pitchFamily="49" charset="0"/>
+                <a:cs typeface="Courier New" panose="02070309020205020404" pitchFamily="49" charset="0"/>
+              </a:rPr>
+              <a:t>CtrlBranchOp;</a:t>
             </a:r>
           </a:p>
           <a:p>
@@ -16283,21 +16408,7 @@
                 <a:latin typeface="Courier New" panose="02070309020205020404" pitchFamily="49" charset="0"/>
                 <a:cs typeface="Courier New" panose="02070309020205020404" pitchFamily="49" charset="0"/>
               </a:rPr>
-              <a:t> [3:0]   </a:t>
-            </a:r>
-            <a:r>
-              <a:rPr lang="en-US" sz="1400" dirty="0" err="1">
-                <a:latin typeface="Courier New" panose="02070309020205020404" pitchFamily="49" charset="0"/>
-                <a:cs typeface="Courier New" panose="02070309020205020404" pitchFamily="49" charset="0"/>
-              </a:rPr>
-              <a:t>CtrlDMemByteEn</a:t>
-            </a:r>
-            <a:r>
-              <a:rPr lang="en-US" sz="1400" dirty="0">
-                <a:latin typeface="Courier New" panose="02070309020205020404" pitchFamily="49" charset="0"/>
-                <a:cs typeface="Courier New" panose="02070309020205020404" pitchFamily="49" charset="0"/>
-              </a:rPr>
-              <a:t>;</a:t>
+              <a:t> [3:0]   CtrlDMemByteEn;</a:t>
             </a:r>
           </a:p>
           <a:p>
@@ -16319,62 +16430,12 @@
                 <a:latin typeface="Courier New" panose="02070309020205020404" pitchFamily="49" charset="0"/>
                 <a:cs typeface="Courier New" panose="02070309020205020404" pitchFamily="49" charset="0"/>
               </a:rPr>
-              <a:t>         </a:t>
-            </a:r>
+              <a:t>         CtrlDMemWrEn;</a:t>
+            </a:r>
+          </a:p>
+          <a:p>
             <a:r>
               <a:rPr lang="en-US" sz="1400" dirty="0" err="1">
-                <a:latin typeface="Courier New" panose="02070309020205020404" pitchFamily="49" charset="0"/>
-                <a:cs typeface="Courier New" panose="02070309020205020404" pitchFamily="49" charset="0"/>
-              </a:rPr>
-              <a:t>CtrlDMemWrEn</a:t>
-            </a:r>
-            <a:r>
-              <a:rPr lang="en-US" sz="1400" dirty="0">
-                <a:latin typeface="Courier New" panose="02070309020205020404" pitchFamily="49" charset="0"/>
-                <a:cs typeface="Courier New" panose="02070309020205020404" pitchFamily="49" charset="0"/>
-              </a:rPr>
-              <a:t>;</a:t>
-            </a:r>
-          </a:p>
-          <a:p>
-            <a:r>
-              <a:rPr lang="en-US" sz="1400" dirty="0">
-                <a:solidFill>
-                  <a:schemeClr val="bg2">
-                    <a:lumMod val="40000"/>
-                    <a:lumOff val="60000"/>
-                  </a:schemeClr>
-                </a:solidFill>
-                <a:latin typeface="Courier New" panose="02070309020205020404" pitchFamily="49" charset="0"/>
-                <a:cs typeface="Courier New" panose="02070309020205020404" pitchFamily="49" charset="0"/>
-              </a:rPr>
-              <a:t>logic</a:t>
-            </a:r>
-            <a:r>
-              <a:rPr lang="en-US" sz="1400" dirty="0">
-                <a:latin typeface="Courier New" panose="02070309020205020404" pitchFamily="49" charset="0"/>
-                <a:cs typeface="Courier New" panose="02070309020205020404" pitchFamily="49" charset="0"/>
-              </a:rPr>
-              <a:t>         </a:t>
-            </a:r>
-            <a:r>
-              <a:rPr lang="en-US" sz="1400" dirty="0" err="1">
-                <a:latin typeface="Courier New" panose="02070309020205020404" pitchFamily="49" charset="0"/>
-                <a:cs typeface="Courier New" panose="02070309020205020404" pitchFamily="49" charset="0"/>
-              </a:rPr>
-              <a:t>CtrlSignExt</a:t>
-            </a:r>
-            <a:r>
-              <a:rPr lang="en-US" sz="1400" dirty="0">
-                <a:latin typeface="Courier New" panose="02070309020205020404" pitchFamily="49" charset="0"/>
-                <a:cs typeface="Courier New" panose="02070309020205020404" pitchFamily="49" charset="0"/>
-              </a:rPr>
-              <a:t>;</a:t>
-            </a:r>
-          </a:p>
-          <a:p>
-            <a:r>
-              <a:rPr lang="en-US" sz="1400" dirty="0" err="1">
                 <a:solidFill>
                   <a:srgbClr val="E6F8A6"/>
                 </a:solidFill>
@@ -16394,18 +16455,11 @@
               <a:t>      </a:t>
             </a:r>
             <a:r>
-              <a:rPr lang="en-US" sz="1400" dirty="0" err="1">
-                <a:latin typeface="Courier New" panose="02070309020205020404" pitchFamily="49" charset="0"/>
-                <a:cs typeface="Courier New" panose="02070309020205020404" pitchFamily="49" charset="0"/>
-              </a:rPr>
-              <a:t>CtrlAluOp</a:t>
-            </a:r>
-            <a:r>
-              <a:rPr lang="en-US" sz="1400" dirty="0">
-                <a:latin typeface="Courier New" panose="02070309020205020404" pitchFamily="49" charset="0"/>
-                <a:cs typeface="Courier New" panose="02070309020205020404" pitchFamily="49" charset="0"/>
-              </a:rPr>
-              <a:t>;</a:t>
+              <a:rPr lang="en-US" sz="1400" dirty="0">
+                <a:latin typeface="Courier New" panose="02070309020205020404" pitchFamily="49" charset="0"/>
+                <a:cs typeface="Courier New" panose="02070309020205020404" pitchFamily="49" charset="0"/>
+              </a:rPr>
+              <a:t>CtrlAluOp;</a:t>
             </a:r>
           </a:p>
           <a:p>
@@ -16415,6 +16469,18 @@
             </a:endParaRPr>
           </a:p>
           <a:p>
+            <a:endParaRPr lang="en-US" sz="1400" dirty="0">
+              <a:latin typeface="Courier New" panose="02070309020205020404" pitchFamily="49" charset="0"/>
+              <a:cs typeface="Courier New" panose="02070309020205020404" pitchFamily="49" charset="0"/>
+            </a:endParaRPr>
+          </a:p>
+          <a:p>
+            <a:endParaRPr lang="en-US" sz="1400" dirty="0">
+              <a:latin typeface="Courier New" panose="02070309020205020404" pitchFamily="49" charset="0"/>
+              <a:cs typeface="Courier New" panose="02070309020205020404" pitchFamily="49" charset="0"/>
+            </a:endParaRPr>
+          </a:p>
+          <a:p>
             <a:r>
               <a:rPr lang="en-US" b="1" dirty="0">
                 <a:solidFill>
@@ -16538,43 +16604,14 @@
               <a:t>;</a:t>
             </a:r>
           </a:p>
+          <a:p>
+            <a:endParaRPr lang="en-US" sz="1400" dirty="0">
+              <a:latin typeface="Courier New" panose="02070309020205020404" pitchFamily="49" charset="0"/>
+              <a:cs typeface="Courier New" panose="02070309020205020404" pitchFamily="49" charset="0"/>
+            </a:endParaRPr>
+          </a:p>
         </p:txBody>
       </p:sp>
-      <p:pic>
-        <p:nvPicPr>
-          <p:cNvPr id="8" name="Content Placeholder 3">
-            <a:extLst>
-              <a:ext uri="{FF2B5EF4-FFF2-40B4-BE49-F238E27FC236}">
-                <a16:creationId xmlns:a16="http://schemas.microsoft.com/office/drawing/2014/main" id="{FEA7B9ED-577F-487F-8404-0BA081C41341}"/>
-              </a:ext>
-            </a:extLst>
-          </p:cNvPr>
-          <p:cNvPicPr>
-            <a:picLocks noChangeAspect="1"/>
-          </p:cNvPicPr>
-          <p:nvPr/>
-        </p:nvPicPr>
-        <p:blipFill>
-          <a:blip r:embed="rId2">
-            <a:extLst>
-              <a:ext uri="{28A0092B-C50C-407E-A947-70E740481C1C}">
-                <a14:useLocalDpi xmlns:a14="http://schemas.microsoft.com/office/drawing/2010/main" val="0"/>
-              </a:ext>
-            </a:extLst>
-          </a:blip>
-          <a:srcRect/>
-          <a:stretch/>
-        </p:blipFill>
-        <p:spPr>
-          <a:xfrm>
-            <a:off x="4727149" y="1269955"/>
-            <a:ext cx="7373412" cy="5462315"/>
-          </a:xfrm>
-          <a:prstGeom prst="rect">
-            <a:avLst/>
-          </a:prstGeom>
-        </p:spPr>
-      </p:pic>
     </p:spTree>
     <p:extLst>
       <p:ext uri="{BB962C8B-B14F-4D97-AF65-F5344CB8AC3E}">
@@ -18118,10 +18155,10 @@
       </p:sp>
       <p:sp>
         <p:nvSpPr>
-          <p:cNvPr id="7" name="Rectangle 6">
+          <p:cNvPr id="3" name="Rectangle 2">
             <a:extLst>
               <a:ext uri="{FF2B5EF4-FFF2-40B4-BE49-F238E27FC236}">
-                <a16:creationId xmlns:a16="http://schemas.microsoft.com/office/drawing/2014/main" id="{15E8E142-BB57-4677-A5AF-DC8DE9430F7F}"/>
+                <a16:creationId xmlns:a16="http://schemas.microsoft.com/office/drawing/2014/main" id="{6429B7FB-8CA7-0F15-C50E-A03742A2C062}"/>
               </a:ext>
             </a:extLst>
           </p:cNvPr>
@@ -18131,7 +18168,7 @@
         <p:spPr>
           <a:xfrm>
             <a:off x="206514" y="1913670"/>
-            <a:ext cx="4447298" cy="4185761"/>
+            <a:ext cx="4447298" cy="4739759"/>
           </a:xfrm>
           <a:prstGeom prst="rect">
             <a:avLst/>
@@ -18157,7 +18194,7 @@
           <a:lstStyle/>
           <a:p>
             <a:r>
-              <a:rPr lang="en-US" sz="1400" b="1" dirty="0">
+              <a:rPr lang="en-US" b="1" dirty="0">
                 <a:solidFill>
                   <a:schemeClr val="accent4">
                     <a:lumMod val="60000"/>
@@ -18189,21 +18226,7 @@
                 <a:latin typeface="Courier New" panose="02070309020205020404" pitchFamily="49" charset="0"/>
                 <a:cs typeface="Courier New" panose="02070309020205020404" pitchFamily="49" charset="0"/>
               </a:rPr>
-              <a:t>         </a:t>
-            </a:r>
-            <a:r>
-              <a:rPr lang="en-US" sz="1400" dirty="0" err="1">
-                <a:latin typeface="Courier New" panose="02070309020205020404" pitchFamily="49" charset="0"/>
-                <a:cs typeface="Courier New" panose="02070309020205020404" pitchFamily="49" charset="0"/>
-              </a:rPr>
-              <a:t>SelNextPcAluOut</a:t>
-            </a:r>
-            <a:r>
-              <a:rPr lang="en-US" sz="1400" dirty="0">
-                <a:latin typeface="Courier New" panose="02070309020205020404" pitchFamily="49" charset="0"/>
-                <a:cs typeface="Courier New" panose="02070309020205020404" pitchFamily="49" charset="0"/>
-              </a:rPr>
-              <a:t>;</a:t>
+              <a:t>         SelNextPcAluOut;</a:t>
             </a:r>
           </a:p>
           <a:p>
@@ -18225,21 +18248,7 @@
                 <a:latin typeface="Courier New" panose="02070309020205020404" pitchFamily="49" charset="0"/>
                 <a:cs typeface="Courier New" panose="02070309020205020404" pitchFamily="49" charset="0"/>
               </a:rPr>
-              <a:t>         </a:t>
-            </a:r>
-            <a:r>
-              <a:rPr lang="en-US" sz="1400" dirty="0" err="1">
-                <a:latin typeface="Courier New" panose="02070309020205020404" pitchFamily="49" charset="0"/>
-                <a:cs typeface="Courier New" panose="02070309020205020404" pitchFamily="49" charset="0"/>
-              </a:rPr>
-              <a:t>SelRegWrPc</a:t>
-            </a:r>
-            <a:r>
-              <a:rPr lang="en-US" sz="1400" dirty="0">
-                <a:latin typeface="Courier New" panose="02070309020205020404" pitchFamily="49" charset="0"/>
-                <a:cs typeface="Courier New" panose="02070309020205020404" pitchFamily="49" charset="0"/>
-              </a:rPr>
-              <a:t>;</a:t>
+              <a:t>         SelRegWrPc; </a:t>
             </a:r>
           </a:p>
           <a:p>
@@ -18261,21 +18270,7 @@
                 <a:latin typeface="Courier New" panose="02070309020205020404" pitchFamily="49" charset="0"/>
                 <a:cs typeface="Courier New" panose="02070309020205020404" pitchFamily="49" charset="0"/>
               </a:rPr>
-              <a:t>         </a:t>
-            </a:r>
-            <a:r>
-              <a:rPr lang="en-US" sz="1400" dirty="0" err="1">
-                <a:latin typeface="Courier New" panose="02070309020205020404" pitchFamily="49" charset="0"/>
-                <a:cs typeface="Courier New" panose="02070309020205020404" pitchFamily="49" charset="0"/>
-              </a:rPr>
-              <a:t>BranchCondMet</a:t>
-            </a:r>
-            <a:r>
-              <a:rPr lang="en-US" sz="1400" dirty="0">
-                <a:latin typeface="Courier New" panose="02070309020205020404" pitchFamily="49" charset="0"/>
-                <a:cs typeface="Courier New" panose="02070309020205020404" pitchFamily="49" charset="0"/>
-              </a:rPr>
-              <a:t>; </a:t>
+              <a:t>         SelDMemWb;</a:t>
             </a:r>
           </a:p>
           <a:p>
@@ -18297,21 +18292,7 @@
                 <a:latin typeface="Courier New" panose="02070309020205020404" pitchFamily="49" charset="0"/>
                 <a:cs typeface="Courier New" panose="02070309020205020404" pitchFamily="49" charset="0"/>
               </a:rPr>
-              <a:t>         </a:t>
-            </a:r>
-            <a:r>
-              <a:rPr lang="en-US" sz="1400" dirty="0" err="1">
-                <a:latin typeface="Courier New" panose="02070309020205020404" pitchFamily="49" charset="0"/>
-                <a:cs typeface="Courier New" panose="02070309020205020404" pitchFamily="49" charset="0"/>
-              </a:rPr>
-              <a:t>SelDMemWb</a:t>
-            </a:r>
-            <a:r>
-              <a:rPr lang="en-US" sz="1400" dirty="0">
-                <a:latin typeface="Courier New" panose="02070309020205020404" pitchFamily="49" charset="0"/>
-                <a:cs typeface="Courier New" panose="02070309020205020404" pitchFamily="49" charset="0"/>
-              </a:rPr>
-              <a:t>;</a:t>
+              <a:t>         SelAluPc ;</a:t>
             </a:r>
           </a:p>
           <a:p>
@@ -18333,21 +18314,36 @@
                 <a:latin typeface="Courier New" panose="02070309020205020404" pitchFamily="49" charset="0"/>
                 <a:cs typeface="Courier New" panose="02070309020205020404" pitchFamily="49" charset="0"/>
               </a:rPr>
-              <a:t>         </a:t>
-            </a:r>
+              <a:t>         SelAluImm;</a:t>
+            </a:r>
+          </a:p>
+          <a:p>
             <a:r>
               <a:rPr lang="en-US" sz="1400" dirty="0" err="1">
-                <a:latin typeface="Courier New" panose="02070309020205020404" pitchFamily="49" charset="0"/>
-                <a:cs typeface="Courier New" panose="02070309020205020404" pitchFamily="49" charset="0"/>
-              </a:rPr>
-              <a:t>SelAluPc</a:t>
-            </a:r>
-            <a:r>
-              <a:rPr lang="en-US" sz="1400" dirty="0">
-                <a:latin typeface="Courier New" panose="02070309020205020404" pitchFamily="49" charset="0"/>
-                <a:cs typeface="Courier New" panose="02070309020205020404" pitchFamily="49" charset="0"/>
-              </a:rPr>
-              <a:t> ;</a:t>
+                <a:solidFill>
+                  <a:srgbClr val="E6F8A6"/>
+                </a:solidFill>
+                <a:latin typeface="Courier New" panose="02070309020205020404" pitchFamily="49" charset="0"/>
+                <a:cs typeface="Courier New" panose="02070309020205020404" pitchFamily="49" charset="0"/>
+              </a:rPr>
+              <a:t>t_immediate</a:t>
+            </a:r>
+            <a:r>
+              <a:rPr lang="en-US" sz="1400" dirty="0">
+                <a:solidFill>
+                  <a:srgbClr val="E6F8A6"/>
+                </a:solidFill>
+                <a:latin typeface="Courier New" panose="02070309020205020404" pitchFamily="49" charset="0"/>
+                <a:cs typeface="Courier New" panose="02070309020205020404" pitchFamily="49" charset="0"/>
+              </a:rPr>
+              <a:t>   </a:t>
+            </a:r>
+            <a:r>
+              <a:rPr lang="en-US" sz="1400" dirty="0">
+                <a:latin typeface="Courier New" panose="02070309020205020404" pitchFamily="49" charset="0"/>
+                <a:cs typeface="Courier New" panose="02070309020205020404" pitchFamily="49" charset="0"/>
+              </a:rPr>
+              <a:t>SelImmType;</a:t>
             </a:r>
           </a:p>
           <a:p>
@@ -18369,33 +18365,19 @@
                 <a:latin typeface="Courier New" panose="02070309020205020404" pitchFamily="49" charset="0"/>
                 <a:cs typeface="Courier New" panose="02070309020205020404" pitchFamily="49" charset="0"/>
               </a:rPr>
-              <a:t>         </a:t>
-            </a:r>
+              <a:t>         BranchCondMet;</a:t>
+            </a:r>
+          </a:p>
+          <a:p>
             <a:r>
               <a:rPr lang="en-US" sz="1400" dirty="0" err="1">
-                <a:latin typeface="Courier New" panose="02070309020205020404" pitchFamily="49" charset="0"/>
-                <a:cs typeface="Courier New" panose="02070309020205020404" pitchFamily="49" charset="0"/>
-              </a:rPr>
-              <a:t>SelAluImm</a:t>
-            </a:r>
-            <a:r>
-              <a:rPr lang="en-US" sz="1400" dirty="0">
-                <a:latin typeface="Courier New" panose="02070309020205020404" pitchFamily="49" charset="0"/>
-                <a:cs typeface="Courier New" panose="02070309020205020404" pitchFamily="49" charset="0"/>
-              </a:rPr>
-              <a:t>;</a:t>
-            </a:r>
-          </a:p>
-          <a:p>
-            <a:r>
-              <a:rPr lang="en-US" sz="1400" dirty="0" err="1">
                 <a:solidFill>
                   <a:srgbClr val="E6F8A6"/>
                 </a:solidFill>
                 <a:latin typeface="Courier New" panose="02070309020205020404" pitchFamily="49" charset="0"/>
                 <a:cs typeface="Courier New" panose="02070309020205020404" pitchFamily="49" charset="0"/>
               </a:rPr>
-              <a:t>t_immediate</a:t>
+              <a:t>t_branch_type</a:t>
             </a:r>
             <a:r>
               <a:rPr lang="en-US" sz="1400" dirty="0">
@@ -18405,57 +18387,14 @@
                 <a:latin typeface="Courier New" panose="02070309020205020404" pitchFamily="49" charset="0"/>
                 <a:cs typeface="Courier New" panose="02070309020205020404" pitchFamily="49" charset="0"/>
               </a:rPr>
-              <a:t>   </a:t>
-            </a:r>
-            <a:r>
-              <a:rPr lang="en-US" sz="1400" dirty="0" err="1">
-                <a:latin typeface="Courier New" panose="02070309020205020404" pitchFamily="49" charset="0"/>
-                <a:cs typeface="Courier New" panose="02070309020205020404" pitchFamily="49" charset="0"/>
-              </a:rPr>
-              <a:t>SelImmType</a:t>
-            </a:r>
-            <a:r>
-              <a:rPr lang="en-US" sz="1400" dirty="0">
-                <a:latin typeface="Courier New" panose="02070309020205020404" pitchFamily="49" charset="0"/>
-                <a:cs typeface="Courier New" panose="02070309020205020404" pitchFamily="49" charset="0"/>
-              </a:rPr>
-              <a:t>;</a:t>
-            </a:r>
-          </a:p>
-          <a:p>
-            <a:r>
-              <a:rPr lang="en-US" sz="1400" dirty="0" err="1">
-                <a:solidFill>
-                  <a:srgbClr val="E6F8A6"/>
-                </a:solidFill>
-                <a:latin typeface="Courier New" panose="02070309020205020404" pitchFamily="49" charset="0"/>
-                <a:cs typeface="Courier New" panose="02070309020205020404" pitchFamily="49" charset="0"/>
-              </a:rPr>
-              <a:t>t_branch_type</a:t>
-            </a:r>
-            <a:r>
-              <a:rPr lang="en-US" sz="1400" dirty="0">
-                <a:solidFill>
-                  <a:srgbClr val="E6F8A6"/>
-                </a:solidFill>
-                <a:latin typeface="Courier New" panose="02070309020205020404" pitchFamily="49" charset="0"/>
-                <a:cs typeface="Courier New" panose="02070309020205020404" pitchFamily="49" charset="0"/>
-              </a:rPr>
               <a:t> </a:t>
             </a:r>
             <a:r>
-              <a:rPr lang="en-US" sz="1400" dirty="0" err="1">
-                <a:latin typeface="Courier New" panose="02070309020205020404" pitchFamily="49" charset="0"/>
-                <a:cs typeface="Courier New" panose="02070309020205020404" pitchFamily="49" charset="0"/>
-              </a:rPr>
-              <a:t>CtrlBranchOp</a:t>
-            </a:r>
-            <a:r>
-              <a:rPr lang="en-US" sz="1400" dirty="0">
-                <a:latin typeface="Courier New" panose="02070309020205020404" pitchFamily="49" charset="0"/>
-                <a:cs typeface="Courier New" panose="02070309020205020404" pitchFamily="49" charset="0"/>
-              </a:rPr>
-              <a:t>;</a:t>
+              <a:rPr lang="en-US" sz="1400" dirty="0">
+                <a:latin typeface="Courier New" panose="02070309020205020404" pitchFamily="49" charset="0"/>
+                <a:cs typeface="Courier New" panose="02070309020205020404" pitchFamily="49" charset="0"/>
+              </a:rPr>
+              <a:t>CtrlBranchOp;</a:t>
             </a:r>
           </a:p>
           <a:p>
@@ -18477,21 +18416,7 @@
                 <a:latin typeface="Courier New" panose="02070309020205020404" pitchFamily="49" charset="0"/>
                 <a:cs typeface="Courier New" panose="02070309020205020404" pitchFamily="49" charset="0"/>
               </a:rPr>
-              <a:t> [3:0]   </a:t>
-            </a:r>
-            <a:r>
-              <a:rPr lang="en-US" sz="1400" dirty="0" err="1">
-                <a:latin typeface="Courier New" panose="02070309020205020404" pitchFamily="49" charset="0"/>
-                <a:cs typeface="Courier New" panose="02070309020205020404" pitchFamily="49" charset="0"/>
-              </a:rPr>
-              <a:t>CtrlDMemByteEn</a:t>
-            </a:r>
-            <a:r>
-              <a:rPr lang="en-US" sz="1400" dirty="0">
-                <a:latin typeface="Courier New" panose="02070309020205020404" pitchFamily="49" charset="0"/>
-                <a:cs typeface="Courier New" panose="02070309020205020404" pitchFamily="49" charset="0"/>
-              </a:rPr>
-              <a:t>;</a:t>
+              <a:t> [3:0]   CtrlDMemByteEn;</a:t>
             </a:r>
           </a:p>
           <a:p>
@@ -18513,62 +18438,12 @@
                 <a:latin typeface="Courier New" panose="02070309020205020404" pitchFamily="49" charset="0"/>
                 <a:cs typeface="Courier New" panose="02070309020205020404" pitchFamily="49" charset="0"/>
               </a:rPr>
-              <a:t>         </a:t>
-            </a:r>
+              <a:t>         CtrlDMemWrEn;</a:t>
+            </a:r>
+          </a:p>
+          <a:p>
             <a:r>
               <a:rPr lang="en-US" sz="1400" dirty="0" err="1">
-                <a:latin typeface="Courier New" panose="02070309020205020404" pitchFamily="49" charset="0"/>
-                <a:cs typeface="Courier New" panose="02070309020205020404" pitchFamily="49" charset="0"/>
-              </a:rPr>
-              <a:t>CtrlDMemWrEn</a:t>
-            </a:r>
-            <a:r>
-              <a:rPr lang="en-US" sz="1400" dirty="0">
-                <a:latin typeface="Courier New" panose="02070309020205020404" pitchFamily="49" charset="0"/>
-                <a:cs typeface="Courier New" panose="02070309020205020404" pitchFamily="49" charset="0"/>
-              </a:rPr>
-              <a:t>;</a:t>
-            </a:r>
-          </a:p>
-          <a:p>
-            <a:r>
-              <a:rPr lang="en-US" sz="1400" dirty="0">
-                <a:solidFill>
-                  <a:schemeClr val="bg2">
-                    <a:lumMod val="40000"/>
-                    <a:lumOff val="60000"/>
-                  </a:schemeClr>
-                </a:solidFill>
-                <a:latin typeface="Courier New" panose="02070309020205020404" pitchFamily="49" charset="0"/>
-                <a:cs typeface="Courier New" panose="02070309020205020404" pitchFamily="49" charset="0"/>
-              </a:rPr>
-              <a:t>logic</a:t>
-            </a:r>
-            <a:r>
-              <a:rPr lang="en-US" sz="1400" dirty="0">
-                <a:latin typeface="Courier New" panose="02070309020205020404" pitchFamily="49" charset="0"/>
-                <a:cs typeface="Courier New" panose="02070309020205020404" pitchFamily="49" charset="0"/>
-              </a:rPr>
-              <a:t>         </a:t>
-            </a:r>
-            <a:r>
-              <a:rPr lang="en-US" sz="1400" dirty="0" err="1">
-                <a:latin typeface="Courier New" panose="02070309020205020404" pitchFamily="49" charset="0"/>
-                <a:cs typeface="Courier New" panose="02070309020205020404" pitchFamily="49" charset="0"/>
-              </a:rPr>
-              <a:t>CtrlSignExt</a:t>
-            </a:r>
-            <a:r>
-              <a:rPr lang="en-US" sz="1400" dirty="0">
-                <a:latin typeface="Courier New" panose="02070309020205020404" pitchFamily="49" charset="0"/>
-                <a:cs typeface="Courier New" panose="02070309020205020404" pitchFamily="49" charset="0"/>
-              </a:rPr>
-              <a:t>;</a:t>
-            </a:r>
-          </a:p>
-          <a:p>
-            <a:r>
-              <a:rPr lang="en-US" sz="1400" dirty="0" err="1">
                 <a:solidFill>
                   <a:srgbClr val="E6F8A6"/>
                 </a:solidFill>
@@ -18588,18 +18463,11 @@
               <a:t>      </a:t>
             </a:r>
             <a:r>
-              <a:rPr lang="en-US" sz="1400" dirty="0" err="1">
-                <a:latin typeface="Courier New" panose="02070309020205020404" pitchFamily="49" charset="0"/>
-                <a:cs typeface="Courier New" panose="02070309020205020404" pitchFamily="49" charset="0"/>
-              </a:rPr>
-              <a:t>CtrlAluOp</a:t>
-            </a:r>
-            <a:r>
-              <a:rPr lang="en-US" sz="1400" dirty="0">
-                <a:latin typeface="Courier New" panose="02070309020205020404" pitchFamily="49" charset="0"/>
-                <a:cs typeface="Courier New" panose="02070309020205020404" pitchFamily="49" charset="0"/>
-              </a:rPr>
-              <a:t>;</a:t>
+              <a:rPr lang="en-US" sz="1400" dirty="0">
+                <a:latin typeface="Courier New" panose="02070309020205020404" pitchFamily="49" charset="0"/>
+                <a:cs typeface="Courier New" panose="02070309020205020404" pitchFamily="49" charset="0"/>
+              </a:rPr>
+              <a:t>CtrlAluOp;</a:t>
             </a:r>
           </a:p>
           <a:p>
@@ -18609,8 +18477,20 @@
             </a:endParaRPr>
           </a:p>
           <a:p>
-            <a:r>
-              <a:rPr lang="en-US" sz="1400" b="1" dirty="0">
+            <a:endParaRPr lang="en-US" sz="1400" dirty="0">
+              <a:latin typeface="Courier New" panose="02070309020205020404" pitchFamily="49" charset="0"/>
+              <a:cs typeface="Courier New" panose="02070309020205020404" pitchFamily="49" charset="0"/>
+            </a:endParaRPr>
+          </a:p>
+          <a:p>
+            <a:endParaRPr lang="en-US" sz="1400" dirty="0">
+              <a:latin typeface="Courier New" panose="02070309020205020404" pitchFamily="49" charset="0"/>
+              <a:cs typeface="Courier New" panose="02070309020205020404" pitchFamily="49" charset="0"/>
+            </a:endParaRPr>
+          </a:p>
+          <a:p>
+            <a:r>
+              <a:rPr lang="en-US" b="1" dirty="0">
                 <a:solidFill>
                   <a:schemeClr val="accent4">
                     <a:lumMod val="60000"/>
@@ -18731,6 +18611,12 @@
               </a:rPr>
               <a:t>;</a:t>
             </a:r>
+          </a:p>
+          <a:p>
+            <a:endParaRPr lang="en-US" sz="1400" dirty="0">
+              <a:latin typeface="Courier New" panose="02070309020205020404" pitchFamily="49" charset="0"/>
+              <a:cs typeface="Courier New" panose="02070309020205020404" pitchFamily="49" charset="0"/>
+            </a:endParaRPr>
           </a:p>
         </p:txBody>
       </p:sp>

</xml_diff>